<commit_message>
added some slides to pptx
</commit_message>
<xml_diff>
--- a/Presentations/session6.pptx
+++ b/Presentations/session6.pptx
@@ -13,9 +13,9 @@
     <p:sldId id="266" r:id="rId4"/>
     <p:sldId id="272" r:id="rId5"/>
     <p:sldId id="273" r:id="rId6"/>
-    <p:sldId id="269" r:id="rId7"/>
-    <p:sldId id="271" r:id="rId8"/>
-    <p:sldId id="274" r:id="rId9"/>
+    <p:sldId id="277" r:id="rId7"/>
+    <p:sldId id="269" r:id="rId8"/>
+    <p:sldId id="271" r:id="rId9"/>
     <p:sldId id="275" r:id="rId10"/>
     <p:sldId id="276" r:id="rId11"/>
   </p:sldIdLst>
@@ -4354,47 +4354,69 @@
               <a:rPr lang="de-DE" dirty="0" err="1"/>
               <a:t>Cleaning</a:t>
             </a:r>
-            <a:r>
-              <a:rPr lang="de-DE" dirty="0"/>
-              <a:t> – </a:t>
-            </a:r>
-            <a:r>
-              <a:rPr lang="de-DE" dirty="0" err="1"/>
-              <a:t>Balancing</a:t>
-            </a:r>
-            <a:r>
-              <a:rPr lang="de-DE" dirty="0"/>
-              <a:t> (?)</a:t>
-            </a:r>
             <a:endParaRPr lang="de-AT" dirty="0"/>
           </a:p>
         </p:txBody>
       </p:sp>
-      <p:sp>
-        <p:nvSpPr>
-          <p:cNvPr id="3" name="Inhaltsplatzhalter 2">
+      <p:pic>
+        <p:nvPicPr>
+          <p:cNvPr id="5" name="Inhaltsplatzhalter 4">
             <a:extLst>
               <a:ext uri="{FF2B5EF4-FFF2-40B4-BE49-F238E27FC236}">
-                <a16:creationId xmlns:a16="http://schemas.microsoft.com/office/drawing/2014/main" id="{B85373D0-1008-96FC-7BC6-6727F94C5831}"/>
+                <a16:creationId xmlns:a16="http://schemas.microsoft.com/office/drawing/2014/main" id="{FDFF06EC-411E-8EA1-5993-D61920D609BA}"/>
               </a:ext>
             </a:extLst>
           </p:cNvPr>
-          <p:cNvSpPr>
-            <a:spLocks noGrp="1"/>
-          </p:cNvSpPr>
+          <p:cNvPicPr>
+            <a:picLocks noGrp="1" noChangeAspect="1"/>
+          </p:cNvPicPr>
           <p:nvPr>
             <p:ph idx="1"/>
           </p:nvPr>
-        </p:nvSpPr>
-        <p:spPr/>
-        <p:txBody>
-          <a:bodyPr/>
-          <a:lstStyle/>
-          <a:p>
-            <a:endParaRPr lang="de-AT"/>
-          </a:p>
-        </p:txBody>
-      </p:sp>
+        </p:nvPicPr>
+        <p:blipFill>
+          <a:blip r:embed="rId2"/>
+          <a:stretch>
+            <a:fillRect/>
+          </a:stretch>
+        </p:blipFill>
+        <p:spPr>
+          <a:xfrm>
+            <a:off x="164945" y="1955608"/>
+            <a:ext cx="5492767" cy="4351338"/>
+          </a:xfrm>
+        </p:spPr>
+      </p:pic>
+      <p:pic>
+        <p:nvPicPr>
+          <p:cNvPr id="7" name="Grafik 6">
+            <a:extLst>
+              <a:ext uri="{FF2B5EF4-FFF2-40B4-BE49-F238E27FC236}">
+                <a16:creationId xmlns:a16="http://schemas.microsoft.com/office/drawing/2014/main" id="{7C3D07FF-AF9D-145E-00C0-05CFC06281B0}"/>
+              </a:ext>
+            </a:extLst>
+          </p:cNvPr>
+          <p:cNvPicPr>
+            <a:picLocks noChangeAspect="1"/>
+          </p:cNvPicPr>
+          <p:nvPr/>
+        </p:nvPicPr>
+        <p:blipFill>
+          <a:blip r:embed="rId3"/>
+          <a:stretch>
+            <a:fillRect/>
+          </a:stretch>
+        </p:blipFill>
+        <p:spPr>
+          <a:xfrm>
+            <a:off x="5723355" y="1955608"/>
+            <a:ext cx="5403269" cy="4000551"/>
+          </a:xfrm>
+          <a:prstGeom prst="rect">
+            <a:avLst/>
+          </a:prstGeom>
+        </p:spPr>
+      </p:pic>
     </p:spTree>
     <p:extLst>
       <p:ext uri="{BB962C8B-B14F-4D97-AF65-F5344CB8AC3E}">
@@ -4430,6 +4452,136 @@
           <p:cNvPr id="2" name="Titel 1">
             <a:extLst>
               <a:ext uri="{FF2B5EF4-FFF2-40B4-BE49-F238E27FC236}">
+                <a16:creationId xmlns:a16="http://schemas.microsoft.com/office/drawing/2014/main" id="{6B21BD7D-791E-CD82-A10A-DABC01E8BD2B}"/>
+              </a:ext>
+            </a:extLst>
+          </p:cNvPr>
+          <p:cNvSpPr>
+            <a:spLocks noGrp="1"/>
+          </p:cNvSpPr>
+          <p:nvPr>
+            <p:ph type="title"/>
+          </p:nvPr>
+        </p:nvSpPr>
+        <p:spPr/>
+        <p:txBody>
+          <a:bodyPr/>
+          <a:lstStyle/>
+          <a:p>
+            <a:r>
+              <a:rPr lang="de-DE" dirty="0"/>
+              <a:t>Additional Data </a:t>
+            </a:r>
+            <a:r>
+              <a:rPr lang="de-DE" dirty="0" err="1"/>
+              <a:t>Cleaning</a:t>
+            </a:r>
+            <a:r>
+              <a:rPr lang="de-DE" dirty="0"/>
+              <a:t> &amp; </a:t>
+            </a:r>
+            <a:r>
+              <a:rPr lang="de-DE" dirty="0" err="1"/>
+              <a:t>balancing</a:t>
+            </a:r>
+            <a:endParaRPr lang="de-AT" dirty="0"/>
+          </a:p>
+        </p:txBody>
+      </p:sp>
+      <p:pic>
+        <p:nvPicPr>
+          <p:cNvPr id="5" name="Inhaltsplatzhalter 4">
+            <a:extLst>
+              <a:ext uri="{FF2B5EF4-FFF2-40B4-BE49-F238E27FC236}">
+                <a16:creationId xmlns:a16="http://schemas.microsoft.com/office/drawing/2014/main" id="{A1D122D2-019B-2F94-28C4-1615116D3CD6}"/>
+              </a:ext>
+            </a:extLst>
+          </p:cNvPr>
+          <p:cNvPicPr>
+            <a:picLocks noGrp="1" noChangeAspect="1"/>
+          </p:cNvPicPr>
+          <p:nvPr>
+            <p:ph idx="1"/>
+          </p:nvPr>
+        </p:nvPicPr>
+        <p:blipFill>
+          <a:blip r:embed="rId2"/>
+          <a:stretch>
+            <a:fillRect/>
+          </a:stretch>
+        </p:blipFill>
+        <p:spPr>
+          <a:xfrm>
+            <a:off x="325445" y="1825625"/>
+            <a:ext cx="5524863" cy="4351338"/>
+          </a:xfrm>
+        </p:spPr>
+      </p:pic>
+      <p:pic>
+        <p:nvPicPr>
+          <p:cNvPr id="7" name="Grafik 6">
+            <a:extLst>
+              <a:ext uri="{FF2B5EF4-FFF2-40B4-BE49-F238E27FC236}">
+                <a16:creationId xmlns:a16="http://schemas.microsoft.com/office/drawing/2014/main" id="{BF58212D-1489-7906-B76F-536DBB85639D}"/>
+              </a:ext>
+            </a:extLst>
+          </p:cNvPr>
+          <p:cNvPicPr>
+            <a:picLocks noChangeAspect="1"/>
+          </p:cNvPicPr>
+          <p:nvPr/>
+        </p:nvPicPr>
+        <p:blipFill>
+          <a:blip r:embed="rId3"/>
+          <a:stretch>
+            <a:fillRect/>
+          </a:stretch>
+        </p:blipFill>
+        <p:spPr>
+          <a:xfrm>
+            <a:off x="5940715" y="1825625"/>
+            <a:ext cx="5413085" cy="4128917"/>
+          </a:xfrm>
+          <a:prstGeom prst="rect">
+            <a:avLst/>
+          </a:prstGeom>
+        </p:spPr>
+      </p:pic>
+    </p:spTree>
+    <p:extLst>
+      <p:ext uri="{BB962C8B-B14F-4D97-AF65-F5344CB8AC3E}">
+        <p14:creationId xmlns:p14="http://schemas.microsoft.com/office/powerpoint/2010/main" val="2872905755"/>
+      </p:ext>
+    </p:extLst>
+  </p:cSld>
+  <p:clrMapOvr>
+    <a:masterClrMapping/>
+  </p:clrMapOvr>
+</p:sld>
+</file>
+
+<file path=ppt/slides/slide7.xml><?xml version="1.0" encoding="utf-8"?>
+<p:sld xmlns:a="http://schemas.openxmlformats.org/drawingml/2006/main" xmlns:r="http://schemas.openxmlformats.org/officeDocument/2006/relationships" xmlns:p="http://schemas.openxmlformats.org/presentationml/2006/main">
+  <p:cSld>
+    <p:spTree>
+      <p:nvGrpSpPr>
+        <p:cNvPr id="1" name=""/>
+        <p:cNvGrpSpPr/>
+        <p:nvPr/>
+      </p:nvGrpSpPr>
+      <p:grpSpPr>
+        <a:xfrm>
+          <a:off x="0" y="0"/>
+          <a:ext cx="0" cy="0"/>
+          <a:chOff x="0" y="0"/>
+          <a:chExt cx="0" cy="0"/>
+        </a:xfrm>
+      </p:grpSpPr>
+      <p:sp>
+        <p:nvSpPr>
+          <p:cNvPr id="2" name="Titel 1">
+            <a:extLst>
+              <a:ext uri="{FF2B5EF4-FFF2-40B4-BE49-F238E27FC236}">
                 <a16:creationId xmlns:a16="http://schemas.microsoft.com/office/drawing/2014/main" id="{E2577093-7083-907D-916D-11E25298B63D}"/>
               </a:ext>
             </a:extLst>
@@ -4558,21 +4710,90 @@
           </a:p>
         </p:txBody>
       </p:sp>
+      <p:sp>
+        <p:nvSpPr>
+          <p:cNvPr id="10" name="Inhaltsplatzhalter 9">
+            <a:extLst>
+              <a:ext uri="{FF2B5EF4-FFF2-40B4-BE49-F238E27FC236}">
+                <a16:creationId xmlns:a16="http://schemas.microsoft.com/office/drawing/2014/main" id="{7957AE48-1DB3-415F-D0FC-681FD59C628D}"/>
+              </a:ext>
+            </a:extLst>
+          </p:cNvPr>
+          <p:cNvSpPr>
+            <a:spLocks noGrp="1"/>
+          </p:cNvSpPr>
+          <p:nvPr>
+            <p:ph sz="half" idx="2"/>
+          </p:nvPr>
+        </p:nvSpPr>
+        <p:spPr/>
+        <p:txBody>
+          <a:bodyPr/>
+          <a:lstStyle/>
+          <a:p>
+            <a:r>
+              <a:rPr lang="de-DE" dirty="0"/>
+              <a:t>60 </a:t>
+            </a:r>
+            <a:r>
+              <a:rPr lang="de-DE" dirty="0" err="1"/>
+              <a:t>categories</a:t>
+            </a:r>
+            <a:endParaRPr lang="de-DE" dirty="0"/>
+          </a:p>
+          <a:p>
+            <a:r>
+              <a:rPr lang="de-DE" dirty="0"/>
+              <a:t>~42000 </a:t>
+            </a:r>
+            <a:r>
+              <a:rPr lang="de-DE" dirty="0" err="1"/>
+              <a:t>entries</a:t>
+            </a:r>
+            <a:endParaRPr lang="de-DE" dirty="0"/>
+          </a:p>
+          <a:p>
+            <a:r>
+              <a:rPr lang="de-DE" dirty="0" err="1"/>
+              <a:t>Highes</a:t>
+            </a:r>
+            <a:r>
+              <a:rPr lang="de-DE" dirty="0"/>
+              <a:t>/</a:t>
+            </a:r>
+            <a:r>
+              <a:rPr lang="de-DE" dirty="0" err="1"/>
+              <a:t>lowest</a:t>
+            </a:r>
+            <a:r>
+              <a:rPr lang="de-DE" dirty="0"/>
+              <a:t> </a:t>
+            </a:r>
+            <a:r>
+              <a:rPr lang="de-DE" dirty="0" err="1"/>
+              <a:t>category</a:t>
+            </a:r>
+            <a:r>
+              <a:rPr lang="de-DE" dirty="0"/>
+              <a:t> ~ 50</a:t>
+            </a:r>
+            <a:endParaRPr lang="de-AT" dirty="0"/>
+          </a:p>
+        </p:txBody>
+      </p:sp>
       <p:pic>
         <p:nvPicPr>
-          <p:cNvPr id="7" name="Inhaltsplatzhalter 6">
+          <p:cNvPr id="12" name="Grafik 11" descr="Ein Bild, das Text, Schrift, Screenshot, Zahl enthält.&#10;&#10;Automatisch generierte Beschreibung">
             <a:extLst>
               <a:ext uri="{FF2B5EF4-FFF2-40B4-BE49-F238E27FC236}">
-                <a16:creationId xmlns:a16="http://schemas.microsoft.com/office/drawing/2014/main" id="{9772B4B9-0331-EFE6-7DDD-DC04637F5709}"/>
+                <a16:creationId xmlns:a16="http://schemas.microsoft.com/office/drawing/2014/main" id="{80F48DA9-A407-68ED-B3F7-50D91F1CBE5E}"/>
               </a:ext>
             </a:extLst>
           </p:cNvPr>
           <p:cNvPicPr>
-            <a:picLocks noGrp="1" noChangeAspect="1"/>
+            <a:picLocks noChangeAspect="1"/>
           </p:cNvPicPr>
-          <p:nvPr>
-            <p:ph sz="half" idx="2"/>
-          </p:nvPr>
+          <p:nvPr/>
         </p:nvPicPr>
         <p:blipFill>
           <a:blip r:embed="rId2">
@@ -4582,200 +4803,300 @@
               </a:ext>
             </a:extLst>
           </a:blip>
-          <a:srcRect/>
-          <a:stretch/>
+          <a:stretch>
+            <a:fillRect/>
+          </a:stretch>
         </p:blipFill>
         <p:spPr>
           <a:xfrm>
-            <a:off x="1207363" y="2059622"/>
-            <a:ext cx="3534927" cy="4541173"/>
+            <a:off x="954511" y="4163020"/>
+            <a:ext cx="3819525" cy="1104900"/>
           </a:xfrm>
           <a:prstGeom prst="rect">
             <a:avLst/>
           </a:prstGeom>
         </p:spPr>
       </p:pic>
-      <p:grpSp>
-        <p:nvGrpSpPr>
-          <p:cNvPr id="18" name="Gruppieren 17">
+      <p:sp>
+        <p:nvSpPr>
+          <p:cNvPr id="19" name="Inhaltsplatzhalter 9">
             <a:extLst>
               <a:ext uri="{FF2B5EF4-FFF2-40B4-BE49-F238E27FC236}">
-                <a16:creationId xmlns:a16="http://schemas.microsoft.com/office/drawing/2014/main" id="{612255A0-8102-F1B8-8614-0DCA90320437}"/>
+                <a16:creationId xmlns:a16="http://schemas.microsoft.com/office/drawing/2014/main" id="{18027033-3F61-BB5D-9BD1-E12AD37AE4A6}"/>
               </a:ext>
             </a:extLst>
           </p:cNvPr>
-          <p:cNvGrpSpPr/>
+          <p:cNvSpPr txBox="1">
+            <a:spLocks/>
+          </p:cNvSpPr>
           <p:nvPr/>
-        </p:nvGrpSpPr>
-        <p:grpSpPr>
+        </p:nvSpPr>
+        <p:spPr>
           <a:xfrm>
-            <a:off x="1207363" y="6132441"/>
-            <a:ext cx="3534927" cy="715620"/>
-            <a:chOff x="1207363" y="6132441"/>
-            <a:chExt cx="3534927" cy="715620"/>
+            <a:off x="6059847" y="2503649"/>
+            <a:ext cx="5157787" cy="3684588"/>
           </a:xfrm>
-        </p:grpSpPr>
-        <p:sp>
-          <p:nvSpPr>
-            <p:cNvPr id="14" name="Rechteck 13">
-              <a:extLst>
-                <a:ext uri="{FF2B5EF4-FFF2-40B4-BE49-F238E27FC236}">
-                  <a16:creationId xmlns:a16="http://schemas.microsoft.com/office/drawing/2014/main" id="{AB1AEDC4-55BA-0D2A-142F-676AD83EF57D}"/>
-                </a:ext>
-              </a:extLst>
-            </p:cNvPr>
-            <p:cNvSpPr/>
-            <p:nvPr/>
-          </p:nvSpPr>
-          <p:spPr>
-            <a:xfrm>
-              <a:off x="1207363" y="6380922"/>
-              <a:ext cx="3534927" cy="467139"/>
-            </a:xfrm>
-            <a:prstGeom prst="rect">
-              <a:avLst/>
-            </a:prstGeom>
-            <a:ln>
-              <a:solidFill>
-                <a:schemeClr val="bg1"/>
-              </a:solidFill>
-            </a:ln>
-          </p:spPr>
-          <p:style>
-            <a:lnRef idx="2">
-              <a:schemeClr val="accent6"/>
-            </a:lnRef>
-            <a:fillRef idx="1">
-              <a:schemeClr val="lt1"/>
-            </a:fillRef>
-            <a:effectRef idx="0">
-              <a:schemeClr val="accent6"/>
-            </a:effectRef>
-            <a:fontRef idx="minor">
-              <a:schemeClr val="dk1"/>
-            </a:fontRef>
-          </p:style>
-          <p:txBody>
-            <a:bodyPr rtlCol="0" anchor="ctr"/>
-            <a:lstStyle/>
-            <a:p>
-              <a:pPr algn="ctr"/>
-              <a:endParaRPr lang="de-AT"/>
-            </a:p>
-          </p:txBody>
-        </p:sp>
-        <p:pic>
-          <p:nvPicPr>
-            <p:cNvPr id="13" name="Grafik 12">
-              <a:extLst>
-                <a:ext uri="{FF2B5EF4-FFF2-40B4-BE49-F238E27FC236}">
-                  <a16:creationId xmlns:a16="http://schemas.microsoft.com/office/drawing/2014/main" id="{8997CE53-BFA8-54C3-9053-BD734792CEFB}"/>
-                </a:ext>
-              </a:extLst>
-            </p:cNvPr>
-            <p:cNvPicPr>
-              <a:picLocks noChangeAspect="1"/>
-            </p:cNvPicPr>
-            <p:nvPr/>
-          </p:nvPicPr>
-          <p:blipFill>
-            <a:blip r:embed="rId3"/>
-            <a:stretch>
-              <a:fillRect/>
-            </a:stretch>
-          </p:blipFill>
-          <p:spPr>
-            <a:xfrm>
-              <a:off x="1292087" y="6132441"/>
-              <a:ext cx="3450203" cy="702938"/>
-            </a:xfrm>
-            <a:prstGeom prst="rect">
-              <a:avLst/>
-            </a:prstGeom>
-          </p:spPr>
-        </p:pic>
-      </p:grpSp>
-      <p:grpSp>
-        <p:nvGrpSpPr>
-          <p:cNvPr id="17" name="Gruppieren 16">
+          <a:prstGeom prst="rect">
+            <a:avLst/>
+          </a:prstGeom>
+        </p:spPr>
+        <p:txBody>
+          <a:bodyPr vert="horz" lIns="91440" tIns="45720" rIns="91440" bIns="45720" rtlCol="0">
+            <a:normAutofit/>
+          </a:bodyPr>
+          <a:lstStyle>
+            <a:lvl1pPr marL="228600" indent="-228600" algn="l" defTabSz="914400" rtl="0" eaLnBrk="1" latinLnBrk="0" hangingPunct="1">
+              <a:lnSpc>
+                <a:spcPct val="90000"/>
+              </a:lnSpc>
+              <a:spcBef>
+                <a:spcPts val="1000"/>
+              </a:spcBef>
+              <a:buFont typeface="Arial" panose="020B0604020202020204" pitchFamily="34" charset="0"/>
+              <a:buChar char="•"/>
+              <a:defRPr sz="2800" kern="1200">
+                <a:solidFill>
+                  <a:schemeClr val="tx1"/>
+                </a:solidFill>
+                <a:latin typeface="+mn-lt"/>
+                <a:ea typeface="+mn-ea"/>
+                <a:cs typeface="+mn-cs"/>
+              </a:defRPr>
+            </a:lvl1pPr>
+            <a:lvl2pPr marL="685800" indent="-228600" algn="l" defTabSz="914400" rtl="0" eaLnBrk="1" latinLnBrk="0" hangingPunct="1">
+              <a:lnSpc>
+                <a:spcPct val="90000"/>
+              </a:lnSpc>
+              <a:spcBef>
+                <a:spcPts val="500"/>
+              </a:spcBef>
+              <a:buFont typeface="Arial" panose="020B0604020202020204" pitchFamily="34" charset="0"/>
+              <a:buChar char="•"/>
+              <a:defRPr sz="2400" kern="1200">
+                <a:solidFill>
+                  <a:schemeClr val="tx1"/>
+                </a:solidFill>
+                <a:latin typeface="+mn-lt"/>
+                <a:ea typeface="+mn-ea"/>
+                <a:cs typeface="+mn-cs"/>
+              </a:defRPr>
+            </a:lvl2pPr>
+            <a:lvl3pPr marL="1143000" indent="-228600" algn="l" defTabSz="914400" rtl="0" eaLnBrk="1" latinLnBrk="0" hangingPunct="1">
+              <a:lnSpc>
+                <a:spcPct val="90000"/>
+              </a:lnSpc>
+              <a:spcBef>
+                <a:spcPts val="500"/>
+              </a:spcBef>
+              <a:buFont typeface="Arial" panose="020B0604020202020204" pitchFamily="34" charset="0"/>
+              <a:buChar char="•"/>
+              <a:defRPr sz="2000" kern="1200">
+                <a:solidFill>
+                  <a:schemeClr val="tx1"/>
+                </a:solidFill>
+                <a:latin typeface="+mn-lt"/>
+                <a:ea typeface="+mn-ea"/>
+                <a:cs typeface="+mn-cs"/>
+              </a:defRPr>
+            </a:lvl3pPr>
+            <a:lvl4pPr marL="1600200" indent="-228600" algn="l" defTabSz="914400" rtl="0" eaLnBrk="1" latinLnBrk="0" hangingPunct="1">
+              <a:lnSpc>
+                <a:spcPct val="90000"/>
+              </a:lnSpc>
+              <a:spcBef>
+                <a:spcPts val="500"/>
+              </a:spcBef>
+              <a:buFont typeface="Arial" panose="020B0604020202020204" pitchFamily="34" charset="0"/>
+              <a:buChar char="•"/>
+              <a:defRPr sz="1800" kern="1200">
+                <a:solidFill>
+                  <a:schemeClr val="tx1"/>
+                </a:solidFill>
+                <a:latin typeface="+mn-lt"/>
+                <a:ea typeface="+mn-ea"/>
+                <a:cs typeface="+mn-cs"/>
+              </a:defRPr>
+            </a:lvl4pPr>
+            <a:lvl5pPr marL="2057400" indent="-228600" algn="l" defTabSz="914400" rtl="0" eaLnBrk="1" latinLnBrk="0" hangingPunct="1">
+              <a:lnSpc>
+                <a:spcPct val="90000"/>
+              </a:lnSpc>
+              <a:spcBef>
+                <a:spcPts val="500"/>
+              </a:spcBef>
+              <a:buFont typeface="Arial" panose="020B0604020202020204" pitchFamily="34" charset="0"/>
+              <a:buChar char="•"/>
+              <a:defRPr sz="1800" kern="1200">
+                <a:solidFill>
+                  <a:schemeClr val="tx1"/>
+                </a:solidFill>
+                <a:latin typeface="+mn-lt"/>
+                <a:ea typeface="+mn-ea"/>
+                <a:cs typeface="+mn-cs"/>
+              </a:defRPr>
+            </a:lvl5pPr>
+            <a:lvl6pPr marL="2514600" indent="-228600" algn="l" defTabSz="914400" rtl="0" eaLnBrk="1" latinLnBrk="0" hangingPunct="1">
+              <a:lnSpc>
+                <a:spcPct val="90000"/>
+              </a:lnSpc>
+              <a:spcBef>
+                <a:spcPts val="500"/>
+              </a:spcBef>
+              <a:buFont typeface="Arial" panose="020B0604020202020204" pitchFamily="34" charset="0"/>
+              <a:buChar char="•"/>
+              <a:defRPr sz="1800" kern="1200">
+                <a:solidFill>
+                  <a:schemeClr val="tx1"/>
+                </a:solidFill>
+                <a:latin typeface="+mn-lt"/>
+                <a:ea typeface="+mn-ea"/>
+                <a:cs typeface="+mn-cs"/>
+              </a:defRPr>
+            </a:lvl6pPr>
+            <a:lvl7pPr marL="2971800" indent="-228600" algn="l" defTabSz="914400" rtl="0" eaLnBrk="1" latinLnBrk="0" hangingPunct="1">
+              <a:lnSpc>
+                <a:spcPct val="90000"/>
+              </a:lnSpc>
+              <a:spcBef>
+                <a:spcPts val="500"/>
+              </a:spcBef>
+              <a:buFont typeface="Arial" panose="020B0604020202020204" pitchFamily="34" charset="0"/>
+              <a:buChar char="•"/>
+              <a:defRPr sz="1800" kern="1200">
+                <a:solidFill>
+                  <a:schemeClr val="tx1"/>
+                </a:solidFill>
+                <a:latin typeface="+mn-lt"/>
+                <a:ea typeface="+mn-ea"/>
+                <a:cs typeface="+mn-cs"/>
+              </a:defRPr>
+            </a:lvl7pPr>
+            <a:lvl8pPr marL="3429000" indent="-228600" algn="l" defTabSz="914400" rtl="0" eaLnBrk="1" latinLnBrk="0" hangingPunct="1">
+              <a:lnSpc>
+                <a:spcPct val="90000"/>
+              </a:lnSpc>
+              <a:spcBef>
+                <a:spcPts val="500"/>
+              </a:spcBef>
+              <a:buFont typeface="Arial" panose="020B0604020202020204" pitchFamily="34" charset="0"/>
+              <a:buChar char="•"/>
+              <a:defRPr sz="1800" kern="1200">
+                <a:solidFill>
+                  <a:schemeClr val="tx1"/>
+                </a:solidFill>
+                <a:latin typeface="+mn-lt"/>
+                <a:ea typeface="+mn-ea"/>
+                <a:cs typeface="+mn-cs"/>
+              </a:defRPr>
+            </a:lvl8pPr>
+            <a:lvl9pPr marL="3886200" indent="-228600" algn="l" defTabSz="914400" rtl="0" eaLnBrk="1" latinLnBrk="0" hangingPunct="1">
+              <a:lnSpc>
+                <a:spcPct val="90000"/>
+              </a:lnSpc>
+              <a:spcBef>
+                <a:spcPts val="500"/>
+              </a:spcBef>
+              <a:buFont typeface="Arial" panose="020B0604020202020204" pitchFamily="34" charset="0"/>
+              <a:buChar char="•"/>
+              <a:defRPr sz="1800" kern="1200">
+                <a:solidFill>
+                  <a:schemeClr val="tx1"/>
+                </a:solidFill>
+                <a:latin typeface="+mn-lt"/>
+                <a:ea typeface="+mn-ea"/>
+                <a:cs typeface="+mn-cs"/>
+              </a:defRPr>
+            </a:lvl9pPr>
+          </a:lstStyle>
+          <a:p>
+            <a:r>
+              <a:rPr lang="de-DE" dirty="0"/>
+              <a:t>60 </a:t>
+            </a:r>
+            <a:r>
+              <a:rPr lang="de-DE" dirty="0" err="1"/>
+              <a:t>categories</a:t>
+            </a:r>
+            <a:endParaRPr lang="de-DE" dirty="0"/>
+          </a:p>
+          <a:p>
+            <a:r>
+              <a:rPr lang="de-DE" dirty="0"/>
+              <a:t>~19500 </a:t>
+            </a:r>
+            <a:r>
+              <a:rPr lang="de-DE" dirty="0" err="1"/>
+              <a:t>entries</a:t>
+            </a:r>
+            <a:endParaRPr lang="de-DE" dirty="0"/>
+          </a:p>
+          <a:p>
+            <a:r>
+              <a:rPr lang="de-DE" dirty="0" err="1"/>
+              <a:t>Highes</a:t>
+            </a:r>
+            <a:r>
+              <a:rPr lang="de-DE" dirty="0"/>
+              <a:t>/</a:t>
+            </a:r>
+            <a:r>
+              <a:rPr lang="de-DE" dirty="0" err="1"/>
+              <a:t>lowest</a:t>
+            </a:r>
+            <a:r>
+              <a:rPr lang="de-DE" dirty="0"/>
+              <a:t> </a:t>
+            </a:r>
+            <a:r>
+              <a:rPr lang="de-DE" dirty="0" err="1"/>
+              <a:t>category</a:t>
+            </a:r>
+            <a:r>
+              <a:rPr lang="de-DE" dirty="0"/>
+              <a:t> ~18</a:t>
+            </a:r>
+          </a:p>
+          <a:p>
+            <a:endParaRPr lang="de-AT" dirty="0"/>
+          </a:p>
+        </p:txBody>
+      </p:sp>
+      <p:pic>
+        <p:nvPicPr>
+          <p:cNvPr id="21" name="Grafik 20" descr="Ein Bild, das Text, Schrift, Screenshot, Zahl enthält.&#10;&#10;Automatisch generierte Beschreibung">
             <a:extLst>
               <a:ext uri="{FF2B5EF4-FFF2-40B4-BE49-F238E27FC236}">
-                <a16:creationId xmlns:a16="http://schemas.microsoft.com/office/drawing/2014/main" id="{40415EE7-EBCC-17C7-5000-646F5897DE44}"/>
+                <a16:creationId xmlns:a16="http://schemas.microsoft.com/office/drawing/2014/main" id="{6E584E75-B8E5-7825-29DE-290924BA3149}"/>
               </a:ext>
             </a:extLst>
           </p:cNvPr>
-          <p:cNvGrpSpPr/>
+          <p:cNvPicPr>
+            <a:picLocks noChangeAspect="1"/>
+          </p:cNvPicPr>
           <p:nvPr/>
-        </p:nvGrpSpPr>
-        <p:grpSpPr>
+        </p:nvPicPr>
+        <p:blipFill>
+          <a:blip r:embed="rId3">
+            <a:extLst>
+              <a:ext uri="{28A0092B-C50C-407E-A947-70E740481C1C}">
+                <a14:useLocalDpi xmlns:a14="http://schemas.microsoft.com/office/drawing/2010/main" val="0"/>
+              </a:ext>
+            </a:extLst>
+          </a:blip>
+          <a:stretch>
+            <a:fillRect/>
+          </a:stretch>
+        </p:blipFill>
+        <p:spPr>
           <a:xfrm>
-            <a:off x="6448015" y="2059622"/>
-            <a:ext cx="3534927" cy="4730329"/>
-            <a:chOff x="6448015" y="2059622"/>
-            <a:chExt cx="3534927" cy="4730329"/>
+            <a:off x="6305598" y="4158421"/>
+            <a:ext cx="3819525" cy="1104900"/>
           </a:xfrm>
-        </p:grpSpPr>
-        <p:pic>
-          <p:nvPicPr>
-            <p:cNvPr id="9" name="Grafik 8">
-              <a:extLst>
-                <a:ext uri="{FF2B5EF4-FFF2-40B4-BE49-F238E27FC236}">
-                  <a16:creationId xmlns:a16="http://schemas.microsoft.com/office/drawing/2014/main" id="{927EC226-EBC6-2C1D-ED9E-F2DDF20B78C6}"/>
-                </a:ext>
-              </a:extLst>
-            </p:cNvPr>
-            <p:cNvPicPr>
-              <a:picLocks noChangeAspect="1"/>
-            </p:cNvPicPr>
-            <p:nvPr/>
-          </p:nvPicPr>
-          <p:blipFill>
-            <a:blip r:embed="rId4"/>
-            <a:stretch>
-              <a:fillRect/>
-            </a:stretch>
-          </p:blipFill>
-          <p:spPr>
-            <a:xfrm>
-              <a:off x="6448015" y="2059622"/>
-              <a:ext cx="3534927" cy="4525483"/>
-            </a:xfrm>
-            <a:prstGeom prst="rect">
-              <a:avLst/>
-            </a:prstGeom>
-          </p:spPr>
-        </p:pic>
-        <p:pic>
-          <p:nvPicPr>
-            <p:cNvPr id="16" name="Grafik 15">
-              <a:extLst>
-                <a:ext uri="{FF2B5EF4-FFF2-40B4-BE49-F238E27FC236}">
-                  <a16:creationId xmlns:a16="http://schemas.microsoft.com/office/drawing/2014/main" id="{8212E030-0A66-38A4-FEF1-775DF821BFEF}"/>
-                </a:ext>
-              </a:extLst>
-            </p:cNvPr>
-            <p:cNvPicPr>
-              <a:picLocks noChangeAspect="1"/>
-            </p:cNvPicPr>
-            <p:nvPr/>
-          </p:nvPicPr>
-          <p:blipFill>
-            <a:blip r:embed="rId5"/>
-            <a:stretch>
-              <a:fillRect/>
-            </a:stretch>
-          </p:blipFill>
-          <p:spPr>
-            <a:xfrm>
-              <a:off x="6473104" y="6128716"/>
-              <a:ext cx="3450203" cy="661235"/>
-            </a:xfrm>
-            <a:prstGeom prst="rect">
-              <a:avLst/>
-            </a:prstGeom>
-          </p:spPr>
-        </p:pic>
-      </p:grpSp>
+          <a:prstGeom prst="rect">
+            <a:avLst/>
+          </a:prstGeom>
+        </p:spPr>
+      </p:pic>
     </p:spTree>
     <p:extLst>
       <p:ext uri="{BB962C8B-B14F-4D97-AF65-F5344CB8AC3E}">
@@ -4789,7 +5110,7 @@
 </p:sld>
 </file>
 
-<file path=ppt/slides/slide7.xml><?xml version="1.0" encoding="utf-8"?>
+<file path=ppt/slides/slide8.xml><?xml version="1.0" encoding="utf-8"?>
 <p:sld xmlns:a="http://schemas.openxmlformats.org/drawingml/2006/main" xmlns:r="http://schemas.openxmlformats.org/officeDocument/2006/relationships" xmlns:p="http://schemas.openxmlformats.org/presentationml/2006/main">
   <p:cSld>
     <p:spTree>
@@ -4890,90 +5211,6 @@
 </p:sld>
 </file>
 
-<file path=ppt/slides/slide8.xml><?xml version="1.0" encoding="utf-8"?>
-<p:sld xmlns:a="http://schemas.openxmlformats.org/drawingml/2006/main" xmlns:r="http://schemas.openxmlformats.org/officeDocument/2006/relationships" xmlns:p="http://schemas.openxmlformats.org/presentationml/2006/main">
-  <p:cSld>
-    <p:spTree>
-      <p:nvGrpSpPr>
-        <p:cNvPr id="1" name=""/>
-        <p:cNvGrpSpPr/>
-        <p:nvPr/>
-      </p:nvGrpSpPr>
-      <p:grpSpPr>
-        <a:xfrm>
-          <a:off x="0" y="0"/>
-          <a:ext cx="0" cy="0"/>
-          <a:chOff x="0" y="0"/>
-          <a:chExt cx="0" cy="0"/>
-        </a:xfrm>
-      </p:grpSpPr>
-      <p:sp>
-        <p:nvSpPr>
-          <p:cNvPr id="2" name="Titel 1">
-            <a:extLst>
-              <a:ext uri="{FF2B5EF4-FFF2-40B4-BE49-F238E27FC236}">
-                <a16:creationId xmlns:a16="http://schemas.microsoft.com/office/drawing/2014/main" id="{CC5718A3-80E2-A263-06B0-0CAA667E9D02}"/>
-              </a:ext>
-            </a:extLst>
-          </p:cNvPr>
-          <p:cNvSpPr>
-            <a:spLocks noGrp="1"/>
-          </p:cNvSpPr>
-          <p:nvPr>
-            <p:ph type="title"/>
-          </p:nvPr>
-        </p:nvSpPr>
-        <p:spPr/>
-        <p:txBody>
-          <a:bodyPr/>
-          <a:lstStyle/>
-          <a:p>
-            <a:r>
-              <a:rPr lang="de-DE" dirty="0"/>
-              <a:t>Support Vector Machines</a:t>
-            </a:r>
-            <a:endParaRPr lang="de-AT" dirty="0"/>
-          </a:p>
-        </p:txBody>
-      </p:sp>
-      <p:sp>
-        <p:nvSpPr>
-          <p:cNvPr id="3" name="Inhaltsplatzhalter 2">
-            <a:extLst>
-              <a:ext uri="{FF2B5EF4-FFF2-40B4-BE49-F238E27FC236}">
-                <a16:creationId xmlns:a16="http://schemas.microsoft.com/office/drawing/2014/main" id="{1EF1EC7B-AB9B-5BE0-D1FF-010247183214}"/>
-              </a:ext>
-            </a:extLst>
-          </p:cNvPr>
-          <p:cNvSpPr>
-            <a:spLocks noGrp="1"/>
-          </p:cNvSpPr>
-          <p:nvPr>
-            <p:ph idx="1"/>
-          </p:nvPr>
-        </p:nvSpPr>
-        <p:spPr/>
-        <p:txBody>
-          <a:bodyPr/>
-          <a:lstStyle/>
-          <a:p>
-            <a:endParaRPr lang="de-AT"/>
-          </a:p>
-        </p:txBody>
-      </p:sp>
-    </p:spTree>
-    <p:extLst>
-      <p:ext uri="{BB962C8B-B14F-4D97-AF65-F5344CB8AC3E}">
-        <p14:creationId xmlns:p14="http://schemas.microsoft.com/office/powerpoint/2010/main" val="1742585658"/>
-      </p:ext>
-    </p:extLst>
-  </p:cSld>
-  <p:clrMapOvr>
-    <a:masterClrMapping/>
-  </p:clrMapOvr>
-</p:sld>
-</file>
-
 <file path=ppt/slides/slide9.xml><?xml version="1.0" encoding="utf-8"?>
 <p:sld xmlns:a="http://schemas.openxmlformats.org/drawingml/2006/main" xmlns:r="http://schemas.openxmlformats.org/officeDocument/2006/relationships" xmlns:p="http://schemas.openxmlformats.org/presentationml/2006/main">
   <p:cSld>
@@ -5014,34 +5251,938 @@
           <a:p>
             <a:r>
               <a:rPr lang="de-DE" dirty="0"/>
-              <a:t>Naive Bayes</a:t>
+              <a:t>Naive Bayes				SVM</a:t>
             </a:r>
             <a:endParaRPr lang="de-AT" dirty="0"/>
           </a:p>
         </p:txBody>
       </p:sp>
-      <p:sp>
-        <p:nvSpPr>
-          <p:cNvPr id="3" name="Inhaltsplatzhalter 2">
+      <p:graphicFrame>
+        <p:nvGraphicFramePr>
+          <p:cNvPr id="4" name="Inhaltsplatzhalter 3">
             <a:extLst>
               <a:ext uri="{FF2B5EF4-FFF2-40B4-BE49-F238E27FC236}">
-                <a16:creationId xmlns:a16="http://schemas.microsoft.com/office/drawing/2014/main" id="{F8B17D75-86F1-87EE-87AD-707603045A97}"/>
+                <a16:creationId xmlns:a16="http://schemas.microsoft.com/office/drawing/2014/main" id="{38475415-CAAC-7DE2-CA5A-143021D84893}"/>
               </a:ext>
             </a:extLst>
           </p:cNvPr>
-          <p:cNvSpPr>
-            <a:spLocks noGrp="1"/>
-          </p:cNvSpPr>
+          <p:cNvGraphicFramePr>
+            <a:graphicFrameLocks noGrp="1"/>
+          </p:cNvGraphicFramePr>
           <p:nvPr>
             <p:ph idx="1"/>
-          </p:nvPr>
-        </p:nvSpPr>
-        <p:spPr/>
-        <p:txBody>
-          <a:bodyPr/>
+            <p:extLst>
+              <p:ext uri="{D42A27DB-BD31-4B8C-83A1-F6EECF244321}">
+                <p14:modId xmlns:p14="http://schemas.microsoft.com/office/powerpoint/2010/main" val="1363849047"/>
+              </p:ext>
+            </p:extLst>
+          </p:nvPr>
+        </p:nvGraphicFramePr>
+        <p:xfrm>
+          <a:off x="1513681" y="3222677"/>
+          <a:ext cx="3810000" cy="908050"/>
+        </p:xfrm>
+        <a:graphic>
+          <a:graphicData uri="http://schemas.openxmlformats.org/drawingml/2006/table">
+            <a:tbl>
+              <a:tblPr/>
+              <a:tblGrid>
+                <a:gridCol w="762000">
+                  <a:extLst>
+                    <a:ext uri="{9D8B030D-6E8A-4147-A177-3AD203B41FA5}">
+                      <a16:colId xmlns:a16="http://schemas.microsoft.com/office/drawing/2014/main" val="2026561441"/>
+                    </a:ext>
+                  </a:extLst>
+                </a:gridCol>
+                <a:gridCol w="762000">
+                  <a:extLst>
+                    <a:ext uri="{9D8B030D-6E8A-4147-A177-3AD203B41FA5}">
+                      <a16:colId xmlns:a16="http://schemas.microsoft.com/office/drawing/2014/main" val="4199117303"/>
+                    </a:ext>
+                  </a:extLst>
+                </a:gridCol>
+                <a:gridCol w="762000">
+                  <a:extLst>
+                    <a:ext uri="{9D8B030D-6E8A-4147-A177-3AD203B41FA5}">
+                      <a16:colId xmlns:a16="http://schemas.microsoft.com/office/drawing/2014/main" val="2636112265"/>
+                    </a:ext>
+                  </a:extLst>
+                </a:gridCol>
+                <a:gridCol w="762000">
+                  <a:extLst>
+                    <a:ext uri="{9D8B030D-6E8A-4147-A177-3AD203B41FA5}">
+                      <a16:colId xmlns:a16="http://schemas.microsoft.com/office/drawing/2014/main" val="1476217282"/>
+                    </a:ext>
+                  </a:extLst>
+                </a:gridCol>
+                <a:gridCol w="762000">
+                  <a:extLst>
+                    <a:ext uri="{9D8B030D-6E8A-4147-A177-3AD203B41FA5}">
+                      <a16:colId xmlns:a16="http://schemas.microsoft.com/office/drawing/2014/main" val="1403463096"/>
+                    </a:ext>
+                  </a:extLst>
+                </a:gridCol>
+              </a:tblGrid>
+              <a:tr h="181610">
+                <a:tc>
+                  <a:txBody>
+                    <a:bodyPr/>
+                    <a:lstStyle/>
+                    <a:p>
+                      <a:pPr algn="l" fontAlgn="b"/>
+                      <a:endParaRPr lang="de-AT" sz="1100" b="0" i="0" u="none" strike="noStrike" dirty="0">
+                        <a:solidFill>
+                          <a:srgbClr val="000000"/>
+                        </a:solidFill>
+                        <a:effectLst/>
+                        <a:latin typeface="Calibri" panose="020F0502020204030204" pitchFamily="34" charset="0"/>
+                      </a:endParaRPr>
+                    </a:p>
+                  </a:txBody>
+                  <a:tcPr marL="8626" marR="8626" marT="8626" marB="0" anchor="b">
+                    <a:lnL>
+                      <a:noFill/>
+                    </a:lnL>
+                    <a:lnR>
+                      <a:noFill/>
+                    </a:lnR>
+                    <a:lnT>
+                      <a:noFill/>
+                    </a:lnT>
+                    <a:lnB>
+                      <a:noFill/>
+                    </a:lnB>
+                  </a:tcPr>
+                </a:tc>
+                <a:tc>
+                  <a:txBody>
+                    <a:bodyPr/>
+                    <a:lstStyle/>
+                    <a:p>
+                      <a:pPr algn="l" fontAlgn="b"/>
+                      <a:endParaRPr lang="de-AT" sz="1100" b="0" i="0" u="none" strike="noStrike">
+                        <a:solidFill>
+                          <a:srgbClr val="000000"/>
+                        </a:solidFill>
+                        <a:effectLst/>
+                        <a:latin typeface="Calibri" panose="020F0502020204030204" pitchFamily="34" charset="0"/>
+                      </a:endParaRPr>
+                    </a:p>
+                  </a:txBody>
+                  <a:tcPr marL="8626" marR="8626" marT="8626" marB="0" anchor="b">
+                    <a:lnL>
+                      <a:noFill/>
+                    </a:lnL>
+                    <a:lnR>
+                      <a:noFill/>
+                    </a:lnR>
+                    <a:lnT>
+                      <a:noFill/>
+                    </a:lnT>
+                    <a:lnB>
+                      <a:noFill/>
+                    </a:lnB>
+                  </a:tcPr>
+                </a:tc>
+                <a:tc>
+                  <a:txBody>
+                    <a:bodyPr/>
+                    <a:lstStyle/>
+                    <a:p>
+                      <a:pPr algn="l" fontAlgn="b"/>
+                      <a:endParaRPr lang="de-AT" sz="1100" b="0" i="0" u="none" strike="noStrike">
+                        <a:solidFill>
+                          <a:srgbClr val="000000"/>
+                        </a:solidFill>
+                        <a:effectLst/>
+                        <a:latin typeface="Calibri" panose="020F0502020204030204" pitchFamily="34" charset="0"/>
+                      </a:endParaRPr>
+                    </a:p>
+                  </a:txBody>
+                  <a:tcPr marL="8626" marR="8626" marT="8626" marB="0" anchor="b">
+                    <a:lnL>
+                      <a:noFill/>
+                    </a:lnL>
+                    <a:lnR>
+                      <a:noFill/>
+                    </a:lnR>
+                    <a:lnT>
+                      <a:noFill/>
+                    </a:lnT>
+                    <a:lnB>
+                      <a:noFill/>
+                    </a:lnB>
+                  </a:tcPr>
+                </a:tc>
+                <a:tc>
+                  <a:txBody>
+                    <a:bodyPr/>
+                    <a:lstStyle/>
+                    <a:p>
+                      <a:pPr algn="l" fontAlgn="b"/>
+                      <a:endParaRPr lang="de-AT" sz="1100" b="0" i="0" u="none" strike="noStrike">
+                        <a:solidFill>
+                          <a:srgbClr val="000000"/>
+                        </a:solidFill>
+                        <a:effectLst/>
+                        <a:latin typeface="Calibri" panose="020F0502020204030204" pitchFamily="34" charset="0"/>
+                      </a:endParaRPr>
+                    </a:p>
+                  </a:txBody>
+                  <a:tcPr marL="8626" marR="8626" marT="8626" marB="0" anchor="b">
+                    <a:lnL>
+                      <a:noFill/>
+                    </a:lnL>
+                    <a:lnR>
+                      <a:noFill/>
+                    </a:lnR>
+                    <a:lnT>
+                      <a:noFill/>
+                    </a:lnT>
+                    <a:lnB>
+                      <a:noFill/>
+                    </a:lnB>
+                  </a:tcPr>
+                </a:tc>
+                <a:tc>
+                  <a:txBody>
+                    <a:bodyPr/>
+                    <a:lstStyle/>
+                    <a:p>
+                      <a:pPr algn="l" fontAlgn="b"/>
+                      <a:endParaRPr lang="de-AT" sz="1100" b="0" i="0" u="none" strike="noStrike">
+                        <a:solidFill>
+                          <a:srgbClr val="000000"/>
+                        </a:solidFill>
+                        <a:effectLst/>
+                        <a:latin typeface="Calibri" panose="020F0502020204030204" pitchFamily="34" charset="0"/>
+                      </a:endParaRPr>
+                    </a:p>
+                  </a:txBody>
+                  <a:tcPr marL="8626" marR="8626" marT="8626" marB="0" anchor="b">
+                    <a:lnL>
+                      <a:noFill/>
+                    </a:lnL>
+                    <a:lnR>
+                      <a:noFill/>
+                    </a:lnR>
+                    <a:lnT>
+                      <a:noFill/>
+                    </a:lnT>
+                    <a:lnB>
+                      <a:noFill/>
+                    </a:lnB>
+                  </a:tcPr>
+                </a:tc>
+                <a:extLst>
+                  <a:ext uri="{0D108BD9-81ED-4DB2-BD59-A6C34878D82A}">
+                    <a16:rowId xmlns:a16="http://schemas.microsoft.com/office/drawing/2014/main" val="1273701671"/>
+                  </a:ext>
+                </a:extLst>
+              </a:tr>
+              <a:tr h="181610">
+                <a:tc>
+                  <a:txBody>
+                    <a:bodyPr/>
+                    <a:lstStyle/>
+                    <a:p>
+                      <a:pPr algn="l" fontAlgn="b"/>
+                      <a:endParaRPr lang="de-AT" sz="1100" b="0" i="0" u="none" strike="noStrike">
+                        <a:solidFill>
+                          <a:srgbClr val="000000"/>
+                        </a:solidFill>
+                        <a:effectLst/>
+                        <a:latin typeface="Calibri" panose="020F0502020204030204" pitchFamily="34" charset="0"/>
+                      </a:endParaRPr>
+                    </a:p>
+                  </a:txBody>
+                  <a:tcPr marL="8626" marR="8626" marT="8626" marB="0" anchor="b">
+                    <a:lnL>
+                      <a:noFill/>
+                    </a:lnL>
+                    <a:lnR>
+                      <a:noFill/>
+                    </a:lnR>
+                    <a:lnT>
+                      <a:noFill/>
+                    </a:lnT>
+                    <a:lnB>
+                      <a:noFill/>
+                    </a:lnB>
+                  </a:tcPr>
+                </a:tc>
+                <a:tc>
+                  <a:txBody>
+                    <a:bodyPr/>
+                    <a:lstStyle/>
+                    <a:p>
+                      <a:pPr algn="l" fontAlgn="b"/>
+                      <a:endParaRPr lang="de-AT" sz="1100" b="0" i="0" u="none" strike="noStrike">
+                        <a:solidFill>
+                          <a:srgbClr val="000000"/>
+                        </a:solidFill>
+                        <a:effectLst/>
+                        <a:latin typeface="Calibri" panose="020F0502020204030204" pitchFamily="34" charset="0"/>
+                      </a:endParaRPr>
+                    </a:p>
+                  </a:txBody>
+                  <a:tcPr marL="8626" marR="8626" marT="8626" marB="0" anchor="b">
+                    <a:lnL>
+                      <a:noFill/>
+                    </a:lnL>
+                    <a:lnR>
+                      <a:noFill/>
+                    </a:lnR>
+                    <a:lnT>
+                      <a:noFill/>
+                    </a:lnT>
+                    <a:lnB>
+                      <a:noFill/>
+                    </a:lnB>
+                  </a:tcPr>
+                </a:tc>
+                <a:tc>
+                  <a:txBody>
+                    <a:bodyPr/>
+                    <a:lstStyle/>
+                    <a:p>
+                      <a:pPr algn="l" fontAlgn="b"/>
+                      <a:endParaRPr lang="de-AT" sz="1100" b="0" i="0" u="none" strike="noStrike">
+                        <a:solidFill>
+                          <a:srgbClr val="000000"/>
+                        </a:solidFill>
+                        <a:effectLst/>
+                        <a:latin typeface="Calibri" panose="020F0502020204030204" pitchFamily="34" charset="0"/>
+                      </a:endParaRPr>
+                    </a:p>
+                  </a:txBody>
+                  <a:tcPr marL="8626" marR="8626" marT="8626" marB="0" anchor="b">
+                    <a:lnL>
+                      <a:noFill/>
+                    </a:lnL>
+                    <a:lnR>
+                      <a:noFill/>
+                    </a:lnR>
+                    <a:lnT>
+                      <a:noFill/>
+                    </a:lnT>
+                    <a:lnB>
+                      <a:noFill/>
+                    </a:lnB>
+                  </a:tcPr>
+                </a:tc>
+                <a:tc>
+                  <a:txBody>
+                    <a:bodyPr/>
+                    <a:lstStyle/>
+                    <a:p>
+                      <a:pPr algn="l" fontAlgn="b"/>
+                      <a:endParaRPr lang="de-AT" sz="1100" b="0" i="0" u="none" strike="noStrike">
+                        <a:solidFill>
+                          <a:srgbClr val="000000"/>
+                        </a:solidFill>
+                        <a:effectLst/>
+                        <a:latin typeface="Calibri" panose="020F0502020204030204" pitchFamily="34" charset="0"/>
+                      </a:endParaRPr>
+                    </a:p>
+                  </a:txBody>
+                  <a:tcPr marL="8626" marR="8626" marT="8626" marB="0" anchor="b">
+                    <a:lnL>
+                      <a:noFill/>
+                    </a:lnL>
+                    <a:lnR>
+                      <a:noFill/>
+                    </a:lnR>
+                    <a:lnT>
+                      <a:noFill/>
+                    </a:lnT>
+                    <a:lnB>
+                      <a:noFill/>
+                    </a:lnB>
+                  </a:tcPr>
+                </a:tc>
+                <a:tc>
+                  <a:txBody>
+                    <a:bodyPr/>
+                    <a:lstStyle/>
+                    <a:p>
+                      <a:pPr algn="l" fontAlgn="b"/>
+                      <a:endParaRPr lang="de-AT" sz="1100" b="0" i="0" u="none" strike="noStrike">
+                        <a:solidFill>
+                          <a:srgbClr val="000000"/>
+                        </a:solidFill>
+                        <a:effectLst/>
+                        <a:latin typeface="Calibri" panose="020F0502020204030204" pitchFamily="34" charset="0"/>
+                      </a:endParaRPr>
+                    </a:p>
+                  </a:txBody>
+                  <a:tcPr marL="8626" marR="8626" marT="8626" marB="0" anchor="b">
+                    <a:lnL>
+                      <a:noFill/>
+                    </a:lnL>
+                    <a:lnR>
+                      <a:noFill/>
+                    </a:lnR>
+                    <a:lnT>
+                      <a:noFill/>
+                    </a:lnT>
+                    <a:lnB>
+                      <a:noFill/>
+                    </a:lnB>
+                  </a:tcPr>
+                </a:tc>
+                <a:extLst>
+                  <a:ext uri="{0D108BD9-81ED-4DB2-BD59-A6C34878D82A}">
+                    <a16:rowId xmlns:a16="http://schemas.microsoft.com/office/drawing/2014/main" val="2836463596"/>
+                  </a:ext>
+                </a:extLst>
+              </a:tr>
+              <a:tr h="181610">
+                <a:tc>
+                  <a:txBody>
+                    <a:bodyPr/>
+                    <a:lstStyle/>
+                    <a:p>
+                      <a:pPr algn="l" fontAlgn="b"/>
+                      <a:endParaRPr lang="de-AT" sz="1100" b="0" i="0" u="none" strike="noStrike">
+                        <a:solidFill>
+                          <a:srgbClr val="000000"/>
+                        </a:solidFill>
+                        <a:effectLst/>
+                        <a:latin typeface="Calibri" panose="020F0502020204030204" pitchFamily="34" charset="0"/>
+                      </a:endParaRPr>
+                    </a:p>
+                  </a:txBody>
+                  <a:tcPr marL="8626" marR="8626" marT="8626" marB="0" anchor="b">
+                    <a:lnL>
+                      <a:noFill/>
+                    </a:lnL>
+                    <a:lnR>
+                      <a:noFill/>
+                    </a:lnR>
+                    <a:lnT>
+                      <a:noFill/>
+                    </a:lnT>
+                    <a:lnB>
+                      <a:noFill/>
+                    </a:lnB>
+                  </a:tcPr>
+                </a:tc>
+                <a:tc>
+                  <a:txBody>
+                    <a:bodyPr/>
+                    <a:lstStyle/>
+                    <a:p>
+                      <a:pPr algn="l" fontAlgn="b"/>
+                      <a:endParaRPr lang="de-AT" sz="1100" b="0" i="0" u="none" strike="noStrike">
+                        <a:solidFill>
+                          <a:srgbClr val="000000"/>
+                        </a:solidFill>
+                        <a:effectLst/>
+                        <a:latin typeface="Calibri" panose="020F0502020204030204" pitchFamily="34" charset="0"/>
+                      </a:endParaRPr>
+                    </a:p>
+                  </a:txBody>
+                  <a:tcPr marL="8626" marR="8626" marT="8626" marB="0" anchor="b">
+                    <a:lnL>
+                      <a:noFill/>
+                    </a:lnL>
+                    <a:lnR>
+                      <a:noFill/>
+                    </a:lnR>
+                    <a:lnT>
+                      <a:noFill/>
+                    </a:lnT>
+                    <a:lnB>
+                      <a:noFill/>
+                    </a:lnB>
+                  </a:tcPr>
+                </a:tc>
+                <a:tc>
+                  <a:txBody>
+                    <a:bodyPr/>
+                    <a:lstStyle/>
+                    <a:p>
+                      <a:pPr algn="l" fontAlgn="b"/>
+                      <a:endParaRPr lang="de-AT" sz="1100" b="0" i="0" u="none" strike="noStrike">
+                        <a:solidFill>
+                          <a:srgbClr val="000000"/>
+                        </a:solidFill>
+                        <a:effectLst/>
+                        <a:latin typeface="Calibri" panose="020F0502020204030204" pitchFamily="34" charset="0"/>
+                      </a:endParaRPr>
+                    </a:p>
+                  </a:txBody>
+                  <a:tcPr marL="8626" marR="8626" marT="8626" marB="0" anchor="b">
+                    <a:lnL>
+                      <a:noFill/>
+                    </a:lnL>
+                    <a:lnR>
+                      <a:noFill/>
+                    </a:lnR>
+                    <a:lnT>
+                      <a:noFill/>
+                    </a:lnT>
+                    <a:lnB>
+                      <a:noFill/>
+                    </a:lnB>
+                  </a:tcPr>
+                </a:tc>
+                <a:tc>
+                  <a:txBody>
+                    <a:bodyPr/>
+                    <a:lstStyle/>
+                    <a:p>
+                      <a:pPr algn="l" fontAlgn="b"/>
+                      <a:endParaRPr lang="de-AT" sz="1100" b="0" i="0" u="none" strike="noStrike">
+                        <a:solidFill>
+                          <a:srgbClr val="000000"/>
+                        </a:solidFill>
+                        <a:effectLst/>
+                        <a:latin typeface="Calibri" panose="020F0502020204030204" pitchFamily="34" charset="0"/>
+                      </a:endParaRPr>
+                    </a:p>
+                  </a:txBody>
+                  <a:tcPr marL="8626" marR="8626" marT="8626" marB="0" anchor="b">
+                    <a:lnL>
+                      <a:noFill/>
+                    </a:lnL>
+                    <a:lnR>
+                      <a:noFill/>
+                    </a:lnR>
+                    <a:lnT>
+                      <a:noFill/>
+                    </a:lnT>
+                    <a:lnB>
+                      <a:noFill/>
+                    </a:lnB>
+                  </a:tcPr>
+                </a:tc>
+                <a:tc>
+                  <a:txBody>
+                    <a:bodyPr/>
+                    <a:lstStyle/>
+                    <a:p>
+                      <a:pPr algn="l" fontAlgn="b"/>
+                      <a:endParaRPr lang="de-AT" sz="1100" b="0" i="0" u="none" strike="noStrike" dirty="0">
+                        <a:solidFill>
+                          <a:srgbClr val="000000"/>
+                        </a:solidFill>
+                        <a:effectLst/>
+                        <a:latin typeface="Calibri" panose="020F0502020204030204" pitchFamily="34" charset="0"/>
+                      </a:endParaRPr>
+                    </a:p>
+                  </a:txBody>
+                  <a:tcPr marL="8626" marR="8626" marT="8626" marB="0" anchor="b">
+                    <a:lnL>
+                      <a:noFill/>
+                    </a:lnL>
+                    <a:lnR>
+                      <a:noFill/>
+                    </a:lnR>
+                    <a:lnT>
+                      <a:noFill/>
+                    </a:lnT>
+                    <a:lnB>
+                      <a:noFill/>
+                    </a:lnB>
+                  </a:tcPr>
+                </a:tc>
+                <a:extLst>
+                  <a:ext uri="{0D108BD9-81ED-4DB2-BD59-A6C34878D82A}">
+                    <a16:rowId xmlns:a16="http://schemas.microsoft.com/office/drawing/2014/main" val="714832243"/>
+                  </a:ext>
+                </a:extLst>
+              </a:tr>
+              <a:tr h="181610">
+                <a:tc>
+                  <a:txBody>
+                    <a:bodyPr/>
+                    <a:lstStyle/>
+                    <a:p>
+                      <a:pPr algn="l" fontAlgn="b"/>
+                      <a:endParaRPr lang="de-AT" sz="1100" b="0" i="0" u="none" strike="noStrike">
+                        <a:solidFill>
+                          <a:srgbClr val="000000"/>
+                        </a:solidFill>
+                        <a:effectLst/>
+                        <a:latin typeface="Calibri" panose="020F0502020204030204" pitchFamily="34" charset="0"/>
+                      </a:endParaRPr>
+                    </a:p>
+                  </a:txBody>
+                  <a:tcPr marL="8626" marR="8626" marT="8626" marB="0" anchor="b">
+                    <a:lnL>
+                      <a:noFill/>
+                    </a:lnL>
+                    <a:lnR>
+                      <a:noFill/>
+                    </a:lnR>
+                    <a:lnT>
+                      <a:noFill/>
+                    </a:lnT>
+                    <a:lnB>
+                      <a:noFill/>
+                    </a:lnB>
+                  </a:tcPr>
+                </a:tc>
+                <a:tc>
+                  <a:txBody>
+                    <a:bodyPr/>
+                    <a:lstStyle/>
+                    <a:p>
+                      <a:pPr algn="l" fontAlgn="b"/>
+                      <a:endParaRPr lang="de-AT" sz="1100" b="0" i="0" u="none" strike="noStrike">
+                        <a:solidFill>
+                          <a:srgbClr val="000000"/>
+                        </a:solidFill>
+                        <a:effectLst/>
+                        <a:latin typeface="Calibri" panose="020F0502020204030204" pitchFamily="34" charset="0"/>
+                      </a:endParaRPr>
+                    </a:p>
+                  </a:txBody>
+                  <a:tcPr marL="8626" marR="8626" marT="8626" marB="0" anchor="b">
+                    <a:lnL>
+                      <a:noFill/>
+                    </a:lnL>
+                    <a:lnR>
+                      <a:noFill/>
+                    </a:lnR>
+                    <a:lnT>
+                      <a:noFill/>
+                    </a:lnT>
+                    <a:lnB>
+                      <a:noFill/>
+                    </a:lnB>
+                  </a:tcPr>
+                </a:tc>
+                <a:tc>
+                  <a:txBody>
+                    <a:bodyPr/>
+                    <a:lstStyle/>
+                    <a:p>
+                      <a:pPr algn="l" fontAlgn="b"/>
+                      <a:endParaRPr lang="de-AT" sz="1100" b="0" i="0" u="none" strike="noStrike">
+                        <a:solidFill>
+                          <a:srgbClr val="000000"/>
+                        </a:solidFill>
+                        <a:effectLst/>
+                        <a:latin typeface="Calibri" panose="020F0502020204030204" pitchFamily="34" charset="0"/>
+                      </a:endParaRPr>
+                    </a:p>
+                  </a:txBody>
+                  <a:tcPr marL="8626" marR="8626" marT="8626" marB="0" anchor="b">
+                    <a:lnL>
+                      <a:noFill/>
+                    </a:lnL>
+                    <a:lnR>
+                      <a:noFill/>
+                    </a:lnR>
+                    <a:lnT>
+                      <a:noFill/>
+                    </a:lnT>
+                    <a:lnB>
+                      <a:noFill/>
+                    </a:lnB>
+                  </a:tcPr>
+                </a:tc>
+                <a:tc>
+                  <a:txBody>
+                    <a:bodyPr/>
+                    <a:lstStyle/>
+                    <a:p>
+                      <a:pPr algn="l" fontAlgn="b"/>
+                      <a:endParaRPr lang="de-AT" sz="1100" b="0" i="0" u="none" strike="noStrike">
+                        <a:solidFill>
+                          <a:srgbClr val="000000"/>
+                        </a:solidFill>
+                        <a:effectLst/>
+                        <a:latin typeface="Calibri" panose="020F0502020204030204" pitchFamily="34" charset="0"/>
+                      </a:endParaRPr>
+                    </a:p>
+                  </a:txBody>
+                  <a:tcPr marL="8626" marR="8626" marT="8626" marB="0" anchor="b">
+                    <a:lnL>
+                      <a:noFill/>
+                    </a:lnL>
+                    <a:lnR>
+                      <a:noFill/>
+                    </a:lnR>
+                    <a:lnT>
+                      <a:noFill/>
+                    </a:lnT>
+                    <a:lnB>
+                      <a:noFill/>
+                    </a:lnB>
+                  </a:tcPr>
+                </a:tc>
+                <a:tc>
+                  <a:txBody>
+                    <a:bodyPr/>
+                    <a:lstStyle/>
+                    <a:p>
+                      <a:pPr algn="l" fontAlgn="b"/>
+                      <a:endParaRPr lang="de-AT" sz="1100" b="0" i="0" u="none" strike="noStrike">
+                        <a:solidFill>
+                          <a:srgbClr val="000000"/>
+                        </a:solidFill>
+                        <a:effectLst/>
+                        <a:latin typeface="Calibri" panose="020F0502020204030204" pitchFamily="34" charset="0"/>
+                      </a:endParaRPr>
+                    </a:p>
+                  </a:txBody>
+                  <a:tcPr marL="8626" marR="8626" marT="8626" marB="0" anchor="b">
+                    <a:lnL>
+                      <a:noFill/>
+                    </a:lnL>
+                    <a:lnR>
+                      <a:noFill/>
+                    </a:lnR>
+                    <a:lnT>
+                      <a:noFill/>
+                    </a:lnT>
+                    <a:lnB>
+                      <a:noFill/>
+                    </a:lnB>
+                  </a:tcPr>
+                </a:tc>
+                <a:extLst>
+                  <a:ext uri="{0D108BD9-81ED-4DB2-BD59-A6C34878D82A}">
+                    <a16:rowId xmlns:a16="http://schemas.microsoft.com/office/drawing/2014/main" val="3179111860"/>
+                  </a:ext>
+                </a:extLst>
+              </a:tr>
+              <a:tr h="181610">
+                <a:tc>
+                  <a:txBody>
+                    <a:bodyPr/>
+                    <a:lstStyle/>
+                    <a:p>
+                      <a:pPr algn="l" fontAlgn="b"/>
+                      <a:endParaRPr lang="de-AT" sz="1100" b="0" i="0" u="none" strike="noStrike">
+                        <a:solidFill>
+                          <a:srgbClr val="000000"/>
+                        </a:solidFill>
+                        <a:effectLst/>
+                        <a:latin typeface="Calibri" panose="020F0502020204030204" pitchFamily="34" charset="0"/>
+                      </a:endParaRPr>
+                    </a:p>
+                  </a:txBody>
+                  <a:tcPr marL="8626" marR="8626" marT="8626" marB="0" anchor="b">
+                    <a:lnL>
+                      <a:noFill/>
+                    </a:lnL>
+                    <a:lnR>
+                      <a:noFill/>
+                    </a:lnR>
+                    <a:lnT>
+                      <a:noFill/>
+                    </a:lnT>
+                    <a:lnB>
+                      <a:noFill/>
+                    </a:lnB>
+                  </a:tcPr>
+                </a:tc>
+                <a:tc>
+                  <a:txBody>
+                    <a:bodyPr/>
+                    <a:lstStyle/>
+                    <a:p>
+                      <a:pPr algn="l" fontAlgn="b"/>
+                      <a:endParaRPr lang="de-AT" sz="1100" b="0" i="0" u="none" strike="noStrike">
+                        <a:solidFill>
+                          <a:srgbClr val="000000"/>
+                        </a:solidFill>
+                        <a:effectLst/>
+                        <a:latin typeface="Calibri" panose="020F0502020204030204" pitchFamily="34" charset="0"/>
+                      </a:endParaRPr>
+                    </a:p>
+                  </a:txBody>
+                  <a:tcPr marL="8626" marR="8626" marT="8626" marB="0" anchor="b">
+                    <a:lnL>
+                      <a:noFill/>
+                    </a:lnL>
+                    <a:lnR>
+                      <a:noFill/>
+                    </a:lnR>
+                    <a:lnT>
+                      <a:noFill/>
+                    </a:lnT>
+                    <a:lnB>
+                      <a:noFill/>
+                    </a:lnB>
+                  </a:tcPr>
+                </a:tc>
+                <a:tc>
+                  <a:txBody>
+                    <a:bodyPr/>
+                    <a:lstStyle/>
+                    <a:p>
+                      <a:pPr algn="l" fontAlgn="b"/>
+                      <a:endParaRPr lang="de-AT" sz="1100" b="0" i="0" u="none" strike="noStrike">
+                        <a:solidFill>
+                          <a:srgbClr val="000000"/>
+                        </a:solidFill>
+                        <a:effectLst/>
+                        <a:latin typeface="Calibri" panose="020F0502020204030204" pitchFamily="34" charset="0"/>
+                      </a:endParaRPr>
+                    </a:p>
+                  </a:txBody>
+                  <a:tcPr marL="8626" marR="8626" marT="8626" marB="0" anchor="b">
+                    <a:lnL>
+                      <a:noFill/>
+                    </a:lnL>
+                    <a:lnR>
+                      <a:noFill/>
+                    </a:lnR>
+                    <a:lnT>
+                      <a:noFill/>
+                    </a:lnT>
+                    <a:lnB>
+                      <a:noFill/>
+                    </a:lnB>
+                  </a:tcPr>
+                </a:tc>
+                <a:tc>
+                  <a:txBody>
+                    <a:bodyPr/>
+                    <a:lstStyle/>
+                    <a:p>
+                      <a:pPr algn="l" fontAlgn="b"/>
+                      <a:endParaRPr lang="de-AT" sz="1100" b="0" i="0" u="none" strike="noStrike">
+                        <a:solidFill>
+                          <a:srgbClr val="000000"/>
+                        </a:solidFill>
+                        <a:effectLst/>
+                        <a:latin typeface="Calibri" panose="020F0502020204030204" pitchFamily="34" charset="0"/>
+                      </a:endParaRPr>
+                    </a:p>
+                  </a:txBody>
+                  <a:tcPr marL="8626" marR="8626" marT="8626" marB="0" anchor="b">
+                    <a:lnL>
+                      <a:noFill/>
+                    </a:lnL>
+                    <a:lnR>
+                      <a:noFill/>
+                    </a:lnR>
+                    <a:lnT>
+                      <a:noFill/>
+                    </a:lnT>
+                    <a:lnB>
+                      <a:noFill/>
+                    </a:lnB>
+                  </a:tcPr>
+                </a:tc>
+                <a:tc>
+                  <a:txBody>
+                    <a:bodyPr/>
+                    <a:lstStyle/>
+                    <a:p>
+                      <a:pPr algn="l" fontAlgn="b"/>
+                      <a:endParaRPr lang="de-AT" sz="1100" b="0" i="0" u="none" strike="noStrike" dirty="0">
+                        <a:solidFill>
+                          <a:srgbClr val="000000"/>
+                        </a:solidFill>
+                        <a:effectLst/>
+                        <a:latin typeface="Calibri" panose="020F0502020204030204" pitchFamily="34" charset="0"/>
+                      </a:endParaRPr>
+                    </a:p>
+                  </a:txBody>
+                  <a:tcPr marL="8626" marR="8626" marT="8626" marB="0" anchor="b">
+                    <a:lnL>
+                      <a:noFill/>
+                    </a:lnL>
+                    <a:lnR>
+                      <a:noFill/>
+                    </a:lnR>
+                    <a:lnT>
+                      <a:noFill/>
+                    </a:lnT>
+                    <a:lnB>
+                      <a:noFill/>
+                    </a:lnB>
+                  </a:tcPr>
+                </a:tc>
+                <a:extLst>
+                  <a:ext uri="{0D108BD9-81ED-4DB2-BD59-A6C34878D82A}">
+                    <a16:rowId xmlns:a16="http://schemas.microsoft.com/office/drawing/2014/main" val="3560371180"/>
+                  </a:ext>
+                </a:extLst>
+              </a:tr>
+            </a:tbl>
+          </a:graphicData>
+        </a:graphic>
+      </p:graphicFrame>
+      <p:pic>
+        <p:nvPicPr>
+          <p:cNvPr id="6" name="Grafik 5">
+            <a:extLst>
+              <a:ext uri="{FF2B5EF4-FFF2-40B4-BE49-F238E27FC236}">
+                <a16:creationId xmlns:a16="http://schemas.microsoft.com/office/drawing/2014/main" id="{01B5275F-E6E5-B88E-31DE-407A5A458B09}"/>
+              </a:ext>
+            </a:extLst>
+          </p:cNvPr>
+          <p:cNvPicPr>
+            <a:picLocks noChangeAspect="1"/>
+          </p:cNvPicPr>
+          <p:nvPr/>
+        </p:nvPicPr>
+        <p:blipFill>
+          <a:blip r:embed="rId2"/>
+          <a:stretch>
+            <a:fillRect/>
+          </a:stretch>
+        </p:blipFill>
+        <p:spPr>
+          <a:xfrm>
+            <a:off x="1044848" y="2549058"/>
+            <a:ext cx="3761323" cy="879942"/>
+          </a:xfrm>
+          <a:prstGeom prst="rect">
+            <a:avLst/>
+          </a:prstGeom>
+        </p:spPr>
+      </p:pic>
+      <p:sp>
+        <p:nvSpPr>
+          <p:cNvPr id="7" name="Textfeld 6">
+            <a:extLst>
+              <a:ext uri="{FF2B5EF4-FFF2-40B4-BE49-F238E27FC236}">
+                <a16:creationId xmlns:a16="http://schemas.microsoft.com/office/drawing/2014/main" id="{A9F1A046-88E7-3B69-4DA1-CD5342A00692}"/>
+              </a:ext>
+            </a:extLst>
+          </p:cNvPr>
+          <p:cNvSpPr txBox="1"/>
+          <p:nvPr/>
+        </p:nvSpPr>
+        <p:spPr>
+          <a:xfrm>
+            <a:off x="6096000" y="2619697"/>
+            <a:ext cx="1933286" cy="369332"/>
+          </a:xfrm>
+          <a:prstGeom prst="rect">
+            <a:avLst/>
+          </a:prstGeom>
+          <a:noFill/>
+        </p:spPr>
+        <p:txBody>
+          <a:bodyPr wrap="none" rtlCol="0">
+            <a:spAutoFit/>
+          </a:bodyPr>
           <a:lstStyle/>
           <a:p>
-            <a:endParaRPr lang="de-AT"/>
+            <a:r>
+              <a:rPr lang="de-DE" dirty="0" err="1"/>
+              <a:t>Does</a:t>
+            </a:r>
+            <a:r>
+              <a:rPr lang="de-DE" dirty="0"/>
+              <a:t> not </a:t>
+            </a:r>
+            <a:r>
+              <a:rPr lang="de-DE" dirty="0" err="1"/>
+              <a:t>converge</a:t>
+            </a:r>
+            <a:endParaRPr lang="de-AT" dirty="0"/>
           </a:p>
         </p:txBody>
       </p:sp>

</xml_diff>

<commit_message>
jetzt is echt fertig
</commit_message>
<xml_diff>
--- a/Presentations/session6.pptx
+++ b/Presentations/session6.pptx
@@ -4442,7 +4442,7 @@
           <a:p>
             <a:r>
               <a:rPr lang="de-DE" dirty="0" err="1"/>
-              <a:t>Highes</a:t>
+              <a:t>Highest</a:t>
             </a:r>
             <a:r>
               <a:rPr lang="de-DE" dirty="0"/>
@@ -4719,12 +4719,8 @@
           </a:p>
           <a:p>
             <a:r>
-              <a:rPr lang="de-DE" dirty="0" err="1"/>
-              <a:t>Highes</a:t>
-            </a:r>
-            <a:r>
-              <a:rPr lang="de-DE" dirty="0"/>
-              <a:t>/</a:t>
+              <a:rPr lang="de-DE"/>
+              <a:t>Highest/</a:t>
             </a:r>
             <a:r>
               <a:rPr lang="de-DE" dirty="0" err="1"/>

</xml_diff>